<commit_message>
Final touches for presentation powerpoint + List of names
</commit_message>
<xml_diff>
--- a/Presentation/Presentation.pptx
+++ b/Presentation/Presentation.pptx
@@ -146,7 +146,7 @@
   </p:defaultTextStyle>
   <p:extLst>
     <p:ext uri="{EFAFB233-063F-42B5-8137-9DF3F51BA10A}">
-      <p15:sldGuideLst xmlns:p15="http://schemas.microsoft.com/office/powerpoint/2012/main">
+      <p15:sldGuideLst xmlns:p15="http://schemas.microsoft.com/office/powerpoint/2012/main" xmlns="">
         <p15:guide id="1" orient="horz" pos="2160">
           <p15:clr>
             <a:srgbClr val="A4A3A4"/>
@@ -272,7 +272,7 @@
               <a:pPr>
                 <a:defRPr/>
               </a:pPr>
-              <a:t>4/18/2016</a:t>
+              <a:t>4/18/16</a:t>
             </a:fld>
             <a:endParaRPr lang="en-US"/>
           </a:p>
@@ -1229,7 +1229,7 @@
               <a:pPr>
                 <a:defRPr/>
               </a:pPr>
-              <a:t>4/18/2016</a:t>
+              <a:t>4/18/16</a:t>
             </a:fld>
             <a:endParaRPr lang="en-US"/>
           </a:p>
@@ -1519,7 +1519,7 @@
               <a:pPr>
                 <a:defRPr/>
               </a:pPr>
-              <a:t>4/18/2016</a:t>
+              <a:t>4/18/16</a:t>
             </a:fld>
             <a:endParaRPr lang="en-US"/>
           </a:p>
@@ -1728,7 +1728,7 @@
               <a:pPr>
                 <a:defRPr/>
               </a:pPr>
-              <a:t>4/18/2016</a:t>
+              <a:t>4/18/16</a:t>
             </a:fld>
             <a:endParaRPr lang="en-US"/>
           </a:p>
@@ -2016,7 +2016,7 @@
               <a:pPr>
                 <a:defRPr/>
               </a:pPr>
-              <a:t>4/18/2016</a:t>
+              <a:t>4/18/16</a:t>
             </a:fld>
             <a:endParaRPr lang="en-US"/>
           </a:p>
@@ -2372,7 +2372,7 @@
               <a:pPr>
                 <a:defRPr/>
               </a:pPr>
-              <a:t>4/18/2016</a:t>
+              <a:t>4/18/16</a:t>
             </a:fld>
             <a:endParaRPr lang="en-US"/>
           </a:p>
@@ -3010,7 +3010,7 @@
               <a:pPr>
                 <a:defRPr/>
               </a:pPr>
-              <a:t>4/18/2016</a:t>
+              <a:t>4/18/16</a:t>
             </a:fld>
             <a:endParaRPr lang="en-US"/>
           </a:p>
@@ -3885,7 +3885,7 @@
               <a:pPr>
                 <a:defRPr/>
               </a:pPr>
-              <a:t>4/18/2016</a:t>
+              <a:t>4/18/16</a:t>
             </a:fld>
             <a:endParaRPr lang="en-US"/>
           </a:p>
@@ -4070,7 +4070,7 @@
               <a:pPr>
                 <a:defRPr/>
               </a:pPr>
-              <a:t>4/18/2016</a:t>
+              <a:t>4/18/16</a:t>
             </a:fld>
             <a:endParaRPr lang="en-US"/>
           </a:p>
@@ -4265,7 +4265,7 @@
               <a:pPr>
                 <a:defRPr/>
               </a:pPr>
-              <a:t>4/18/2016</a:t>
+              <a:t>4/18/16</a:t>
             </a:fld>
             <a:endParaRPr lang="en-US"/>
           </a:p>
@@ -4450,7 +4450,7 @@
               <a:pPr>
                 <a:defRPr/>
               </a:pPr>
-              <a:t>4/18/2016</a:t>
+              <a:t>4/18/16</a:t>
             </a:fld>
             <a:endParaRPr lang="en-US"/>
           </a:p>
@@ -4712,7 +4712,7 @@
               <a:pPr>
                 <a:defRPr/>
               </a:pPr>
-              <a:t>4/18/2016</a:t>
+              <a:t>4/18/16</a:t>
             </a:fld>
             <a:endParaRPr lang="en-US"/>
           </a:p>
@@ -5019,7 +5019,7 @@
               <a:pPr>
                 <a:defRPr/>
               </a:pPr>
-              <a:t>4/18/2016</a:t>
+              <a:t>4/18/16</a:t>
             </a:fld>
             <a:endParaRPr lang="en-US"/>
           </a:p>
@@ -5478,7 +5478,7 @@
               <a:pPr>
                 <a:defRPr/>
               </a:pPr>
-              <a:t>4/18/2016</a:t>
+              <a:t>4/18/16</a:t>
             </a:fld>
             <a:endParaRPr lang="en-US"/>
           </a:p>
@@ -5611,7 +5611,7 @@
               <a:pPr>
                 <a:defRPr/>
               </a:pPr>
-              <a:t>4/18/2016</a:t>
+              <a:t>4/18/16</a:t>
             </a:fld>
             <a:endParaRPr lang="en-US"/>
           </a:p>
@@ -5721,7 +5721,7 @@
               <a:pPr>
                 <a:defRPr/>
               </a:pPr>
-              <a:t>4/18/2016</a:t>
+              <a:t>4/18/16</a:t>
             </a:fld>
             <a:endParaRPr lang="en-US"/>
           </a:p>
@@ -6015,7 +6015,7 @@
               <a:pPr>
                 <a:defRPr/>
               </a:pPr>
-              <a:t>4/18/2016</a:t>
+              <a:t>4/18/16</a:t>
             </a:fld>
             <a:endParaRPr lang="en-US"/>
           </a:p>
@@ -6305,7 +6305,7 @@
               <a:pPr>
                 <a:defRPr/>
               </a:pPr>
-              <a:t>4/18/2016</a:t>
+              <a:t>4/18/16</a:t>
             </a:fld>
             <a:endParaRPr lang="en-US"/>
           </a:p>
@@ -6749,7 +6749,7 @@
               <a:pPr>
                 <a:defRPr/>
               </a:pPr>
-              <a:t>4/18/2016</a:t>
+              <a:t>4/18/16</a:t>
             </a:fld>
             <a:endParaRPr lang="en-US"/>
           </a:p>
@@ -7354,11 +7354,7 @@
             </a:pPr>
             <a:r>
               <a:rPr lang="en-US" sz="12800" dirty="0" smtClean="0"/>
-              <a:t>Samuel </a:t>
-            </a:r>
-            <a:r>
-              <a:rPr lang="en-US" sz="12800" dirty="0" smtClean="0"/>
-              <a:t>Roman</a:t>
+              <a:t>Samuel Roman</a:t>
             </a:r>
           </a:p>
           <a:p>
@@ -7410,7 +7406,7 @@
   <p:timing>
     <p:tnLst>
       <p:par>
-        <p:cTn id="1" dur="indefinite" restart="never" nodeType="tmRoot"/>
+        <p:cTn xmlns:p14="http://schemas.microsoft.com/office/powerpoint/2010/main" id="1" dur="indefinite" restart="never" nodeType="tmRoot"/>
       </p:par>
     </p:tnLst>
   </p:timing>
@@ -7474,7 +7470,7 @@
   <p:timing>
     <p:tnLst>
       <p:par>
-        <p:cTn id="1" dur="indefinite" restart="never" nodeType="tmRoot"/>
+        <p:cTn xmlns:p14="http://schemas.microsoft.com/office/powerpoint/2010/main" id="1" dur="indefinite" restart="never" nodeType="tmRoot"/>
       </p:par>
     </p:tnLst>
   </p:timing>
@@ -7663,7 +7659,7 @@
   <p:timing>
     <p:tnLst>
       <p:par>
-        <p:cTn id="1" dur="indefinite" restart="never" nodeType="tmRoot"/>
+        <p:cTn xmlns:p14="http://schemas.microsoft.com/office/powerpoint/2010/main" id="1" dur="indefinite" restart="never" nodeType="tmRoot"/>
       </p:par>
     </p:tnLst>
   </p:timing>
@@ -8065,7 +8061,7 @@
   <p:timing>
     <p:tnLst>
       <p:par>
-        <p:cTn id="1" dur="indefinite" restart="never" nodeType="tmRoot"/>
+        <p:cTn xmlns:p14="http://schemas.microsoft.com/office/powerpoint/2010/main" id="1" dur="indefinite" restart="never" nodeType="tmRoot"/>
       </p:par>
     </p:tnLst>
   </p:timing>
@@ -8105,7 +8101,7 @@
           <a:lstStyle/>
           <a:p>
             <a:r>
-              <a:rPr lang="en-US" smtClean="0"/>
+              <a:rPr lang="en-US" dirty="0" smtClean="0"/>
               <a:t>Julian’s Contribution</a:t>
             </a:r>
           </a:p>
@@ -8123,7 +8119,7 @@
         </p:nvSpPr>
         <p:spPr>
           <a:xfrm>
-            <a:off x="715963" y="1825625"/>
+            <a:off x="715963" y="1613943"/>
             <a:ext cx="10637837" cy="4640263"/>
           </a:xfrm>
         </p:spPr>
@@ -8180,40 +8176,37 @@
             <a:pPr lvl="1"/>
             <a:r>
               <a:rPr lang="en-US" dirty="0" smtClean="0"/>
-              <a:t>Used HTML and PHP for views such as:</a:t>
-            </a:r>
-          </a:p>
-          <a:p>
-            <a:pPr lvl="2"/>
-            <a:r>
-              <a:rPr lang="en-US" dirty="0" err="1" smtClean="0"/>
-              <a:t>ClickedNom</a:t>
+              <a:t>Used HTML and PHP for views such as</a:t>
             </a:r>
             <a:r>
               <a:rPr lang="en-US" dirty="0" smtClean="0"/>
-              <a:t>, </a:t>
-            </a:r>
-            <a:r>
-              <a:rPr lang="en-US" dirty="0" err="1" smtClean="0"/>
-              <a:t>createSession</a:t>
-            </a:r>
+              <a:t>:</a:t>
+            </a:r>
+          </a:p>
+          <a:p>
+            <a:pPr lvl="1"/>
+            <a:endParaRPr lang="en-US" dirty="0"/>
+          </a:p>
+          <a:p>
+            <a:pPr marL="457200" lvl="1" indent="0">
+              <a:buNone/>
+            </a:pPr>
+            <a:endParaRPr lang="en-US" dirty="0" smtClean="0"/>
+          </a:p>
+          <a:p>
+            <a:pPr marL="457200" lvl="1" indent="0">
+              <a:buNone/>
+            </a:pPr>
+            <a:endParaRPr lang="en-US" dirty="0" smtClean="0"/>
+          </a:p>
+          <a:p>
             <a:r>
               <a:rPr lang="en-US" dirty="0" smtClean="0"/>
-              <a:t>, </a:t>
-            </a:r>
-            <a:r>
-              <a:rPr lang="en-US" dirty="0" err="1" smtClean="0"/>
-              <a:t>NomineeForm</a:t>
+              <a:t>Back </a:t>
             </a:r>
             <a:r>
               <a:rPr lang="en-US" dirty="0" smtClean="0"/>
-              <a:t>, and the ones mentioned above.</a:t>
-            </a:r>
-          </a:p>
-          <a:p>
-            <a:r>
-              <a:rPr lang="en-US" dirty="0" smtClean="0"/>
-              <a:t>Back End Development</a:t>
+              <a:t>End Development</a:t>
             </a:r>
           </a:p>
           <a:p>
@@ -8229,305 +8222,6 @@
           <a:p>
             <a:pPr lvl="1"/>
             <a:endParaRPr lang="en-US" dirty="0" smtClean="0"/>
-          </a:p>
-        </p:txBody>
-      </p:sp>
-    </p:spTree>
-  </p:cSld>
-  <p:clrMapOvr>
-    <a:masterClrMapping/>
-  </p:clrMapOvr>
-  <p:timing>
-    <p:tnLst>
-      <p:par>
-        <p:cTn id="1" dur="indefinite" restart="never" nodeType="tmRoot"/>
-      </p:par>
-    </p:tnLst>
-  </p:timing>
-</p:sld>
-</file>
-
-<file path=ppt/slides/slide6.xml><?xml version="1.0" encoding="utf-8"?>
-<p:sld xmlns:a="http://schemas.openxmlformats.org/drawingml/2006/main" xmlns:r="http://schemas.openxmlformats.org/officeDocument/2006/relationships" xmlns:p="http://schemas.openxmlformats.org/presentationml/2006/main">
-  <p:cSld>
-    <p:spTree>
-      <p:nvGrpSpPr>
-        <p:cNvPr id="1" name=""/>
-        <p:cNvGrpSpPr/>
-        <p:nvPr/>
-      </p:nvGrpSpPr>
-      <p:grpSpPr>
-        <a:xfrm>
-          <a:off x="0" y="0"/>
-          <a:ext cx="0" cy="0"/>
-          <a:chOff x="0" y="0"/>
-          <a:chExt cx="0" cy="0"/>
-        </a:xfrm>
-      </p:grpSpPr>
-      <p:sp>
-        <p:nvSpPr>
-          <p:cNvPr id="19458" name="Rectangle 2"/>
-          <p:cNvSpPr>
-            <a:spLocks noGrp="1"/>
-          </p:cNvSpPr>
-          <p:nvPr>
-            <p:ph type="title"/>
-          </p:nvPr>
-        </p:nvSpPr>
-        <p:spPr/>
-        <p:txBody>
-          <a:bodyPr/>
-          <a:lstStyle/>
-          <a:p>
-            <a:r>
-              <a:rPr lang="en-US" dirty="0" smtClean="0"/>
-              <a:t>Alex’s Contribution </a:t>
-            </a:r>
-          </a:p>
-        </p:txBody>
-      </p:sp>
-      <p:sp>
-        <p:nvSpPr>
-          <p:cNvPr id="19459" name="Rectangle 3"/>
-          <p:cNvSpPr>
-            <a:spLocks noGrp="1"/>
-          </p:cNvSpPr>
-          <p:nvPr>
-            <p:ph idx="1"/>
-          </p:nvPr>
-        </p:nvSpPr>
-        <p:spPr>
-          <a:xfrm>
-            <a:off x="1104293" y="1584567"/>
-            <a:ext cx="8946541" cy="4195481"/>
-          </a:xfrm>
-        </p:spPr>
-        <p:txBody>
-          <a:bodyPr>
-            <a:noAutofit/>
-          </a:bodyPr>
-          <a:lstStyle/>
-          <a:p>
-            <a:r>
-              <a:rPr lang="en-US" sz="2400" dirty="0" smtClean="0"/>
-              <a:t>Documentation</a:t>
-            </a:r>
-            <a:endParaRPr lang="en-US" sz="2400" dirty="0"/>
-          </a:p>
-          <a:p>
-            <a:pPr lvl="1"/>
-            <a:r>
-              <a:rPr lang="en-US" sz="2000" dirty="0"/>
-              <a:t>Worked on the documentation/user manual with </a:t>
-            </a:r>
-            <a:r>
-              <a:rPr lang="en-US" sz="2000" dirty="0" smtClean="0"/>
-              <a:t>Sammy</a:t>
-            </a:r>
-          </a:p>
-          <a:p>
-            <a:r>
-              <a:rPr lang="en-US" sz="2400" dirty="0" smtClean="0"/>
-              <a:t>Front </a:t>
-            </a:r>
-            <a:r>
-              <a:rPr lang="en-US" sz="2400" dirty="0"/>
-              <a:t>End </a:t>
-            </a:r>
-            <a:r>
-              <a:rPr lang="en-US" sz="2400" dirty="0" smtClean="0"/>
-              <a:t>Development (HTML/CSS/PHP/JS)</a:t>
-            </a:r>
-            <a:endParaRPr lang="en-US" sz="2400" dirty="0"/>
-          </a:p>
-          <a:p>
-            <a:pPr lvl="1"/>
-            <a:r>
-              <a:rPr lang="en-US" sz="2000" dirty="0" smtClean="0"/>
-              <a:t>Worked on the following views</a:t>
-            </a:r>
-            <a:endParaRPr lang="en-US" sz="2000" dirty="0"/>
-          </a:p>
-          <a:p>
-            <a:pPr lvl="2"/>
-            <a:r>
-              <a:rPr lang="en-US" sz="1800" dirty="0" smtClean="0"/>
-              <a:t>Add nominees, </a:t>
-            </a:r>
-            <a:r>
-              <a:rPr lang="en-US" sz="1800" dirty="0" err="1"/>
-              <a:t>incompleteNominations</a:t>
-            </a:r>
-            <a:r>
-              <a:rPr lang="en-US" sz="1800" dirty="0"/>
-              <a:t> (with Sammy), </a:t>
-            </a:r>
-            <a:r>
-              <a:rPr lang="en-US" sz="1800" dirty="0" err="1" smtClean="0"/>
-              <a:t>createSession</a:t>
-            </a:r>
-            <a:r>
-              <a:rPr lang="en-US" sz="1800" dirty="0" smtClean="0"/>
-              <a:t> (with Julian), </a:t>
-            </a:r>
-            <a:r>
-              <a:rPr lang="en-US" sz="1800" dirty="0" err="1" smtClean="0"/>
-              <a:t>currentSession</a:t>
-            </a:r>
-            <a:r>
-              <a:rPr lang="en-US" sz="1800" dirty="0" smtClean="0"/>
-              <a:t>, </a:t>
-            </a:r>
-            <a:r>
-              <a:rPr lang="en-US" sz="1800" dirty="0" err="1" smtClean="0"/>
-              <a:t>addNominators</a:t>
-            </a:r>
-            <a:r>
-              <a:rPr lang="en-US" sz="1800" dirty="0" smtClean="0"/>
-              <a:t>, persistent sidebar</a:t>
-            </a:r>
-            <a:endParaRPr lang="en-US" sz="1800" dirty="0"/>
-          </a:p>
-          <a:p>
-            <a:pPr lvl="1"/>
-            <a:r>
-              <a:rPr lang="en-US" sz="2000" dirty="0"/>
-              <a:t>Designed the common CSS that is used in most of the </a:t>
-            </a:r>
-            <a:r>
-              <a:rPr lang="en-US" sz="2000" dirty="0" smtClean="0"/>
-              <a:t>forms</a:t>
-            </a:r>
-          </a:p>
-          <a:p>
-            <a:r>
-              <a:rPr lang="en-US" sz="2400" dirty="0" smtClean="0"/>
-              <a:t>Back End Development (PHP, SQL)</a:t>
-            </a:r>
-          </a:p>
-          <a:p>
-            <a:pPr lvl="1"/>
-            <a:r>
-              <a:rPr lang="en-US" sz="2000" dirty="0" smtClean="0"/>
-              <a:t>View for nominee approval (with Robin)</a:t>
-            </a:r>
-          </a:p>
-          <a:p>
-            <a:pPr lvl="1"/>
-            <a:r>
-              <a:rPr lang="en-US" sz="2000" dirty="0" smtClean="0"/>
-              <a:t>View for querying and displaying incomplete nominations</a:t>
-            </a:r>
-          </a:p>
-        </p:txBody>
-      </p:sp>
-    </p:spTree>
-  </p:cSld>
-  <p:clrMapOvr>
-    <a:masterClrMapping/>
-  </p:clrMapOvr>
-  <p:timing>
-    <p:tnLst>
-      <p:par>
-        <p:cTn id="1" dur="indefinite" restart="never" nodeType="tmRoot"/>
-      </p:par>
-    </p:tnLst>
-  </p:timing>
-</p:sld>
-</file>
-
-<file path=ppt/slides/slide7.xml><?xml version="1.0" encoding="utf-8"?>
-<p:sld xmlns:a="http://schemas.openxmlformats.org/drawingml/2006/main" xmlns:r="http://schemas.openxmlformats.org/officeDocument/2006/relationships" xmlns:p="http://schemas.openxmlformats.org/presentationml/2006/main">
-  <p:cSld>
-    <p:spTree>
-      <p:nvGrpSpPr>
-        <p:cNvPr id="1" name=""/>
-        <p:cNvGrpSpPr/>
-        <p:nvPr/>
-      </p:nvGrpSpPr>
-      <p:grpSpPr>
-        <a:xfrm>
-          <a:off x="0" y="0"/>
-          <a:ext cx="0" cy="0"/>
-          <a:chOff x="0" y="0"/>
-          <a:chExt cx="0" cy="0"/>
-        </a:xfrm>
-      </p:grpSpPr>
-      <p:sp>
-        <p:nvSpPr>
-          <p:cNvPr id="2" name="Title 1"/>
-          <p:cNvSpPr>
-            <a:spLocks noGrp="1"/>
-          </p:cNvSpPr>
-          <p:nvPr>
-            <p:ph type="title"/>
-          </p:nvPr>
-        </p:nvSpPr>
-        <p:spPr/>
-        <p:txBody>
-          <a:bodyPr/>
-          <a:lstStyle/>
-          <a:p>
-            <a:r>
-              <a:rPr lang="en-US" dirty="0" smtClean="0"/>
-              <a:t>Sammy’s Contribution</a:t>
-            </a:r>
-            <a:endParaRPr lang="en-US" dirty="0"/>
-          </a:p>
-        </p:txBody>
-      </p:sp>
-      <p:sp>
-        <p:nvSpPr>
-          <p:cNvPr id="3" name="Content Placeholder 2"/>
-          <p:cNvSpPr>
-            <a:spLocks noGrp="1"/>
-          </p:cNvSpPr>
-          <p:nvPr>
-            <p:ph idx="1"/>
-          </p:nvPr>
-        </p:nvSpPr>
-        <p:spPr>
-          <a:xfrm>
-            <a:off x="838200" y="1825625"/>
-            <a:ext cx="10515600" cy="4808855"/>
-          </a:xfrm>
-        </p:spPr>
-        <p:txBody>
-          <a:bodyPr/>
-          <a:lstStyle/>
-          <a:p>
-            <a:r>
-              <a:rPr lang="en-US" dirty="0" smtClean="0"/>
-              <a:t>Worked on the user manual</a:t>
-            </a:r>
-          </a:p>
-          <a:p>
-            <a:r>
-              <a:rPr lang="en-US" dirty="0" smtClean="0"/>
-              <a:t>Wrote the initial schema design for the project</a:t>
-            </a:r>
-          </a:p>
-          <a:p>
-            <a:pPr lvl="1"/>
-            <a:r>
-              <a:rPr lang="en-US" dirty="0" smtClean="0"/>
-              <a:t>Was minimally modified as we worked on the project</a:t>
-            </a:r>
-          </a:p>
-          <a:p>
-            <a:r>
-              <a:rPr lang="en-US" dirty="0" smtClean="0"/>
-              <a:t>Organized the original project directories in compliance to the MVC design pattern</a:t>
-            </a:r>
-          </a:p>
-          <a:p>
-            <a:r>
-              <a:rPr lang="en-US" dirty="0" smtClean="0"/>
-              <a:t>Backend Development:</a:t>
-            </a:r>
-          </a:p>
-          <a:p>
-            <a:endParaRPr lang="en-US" dirty="0"/>
           </a:p>
         </p:txBody>
       </p:sp>
@@ -8541,8 +8235,8 @@
         </p:nvSpPr>
         <p:spPr>
           <a:xfrm>
-            <a:off x="934478" y="4334202"/>
-            <a:ext cx="10323043" cy="1708210"/>
+            <a:off x="1558432" y="4302834"/>
+            <a:ext cx="10633568" cy="1200885"/>
           </a:xfrm>
           <a:prstGeom prst="rect">
             <a:avLst/>
@@ -8722,6 +8416,840 @@
               <a:defRPr/>
             </a:pPr>
             <a:r>
+              <a:rPr lang="en-US" sz="2000" dirty="0" err="1" smtClean="0"/>
+              <a:t>allSessionsView</a:t>
+            </a:r>
+            <a:endParaRPr lang="en-US" sz="2000" dirty="0" smtClean="0"/>
+          </a:p>
+          <a:p>
+            <a:pPr lvl="1" fontAlgn="auto">
+              <a:spcAft>
+                <a:spcPts val="0"/>
+              </a:spcAft>
+              <a:defRPr/>
+            </a:pPr>
+            <a:r>
+              <a:rPr lang="en-US" sz="2000" dirty="0" err="1" smtClean="0"/>
+              <a:t>ScoreTable</a:t>
+            </a:r>
+            <a:r>
+              <a:rPr lang="en-US" sz="2000" dirty="0" smtClean="0"/>
+              <a:t> (w/ Robin)</a:t>
+            </a:r>
+          </a:p>
+          <a:p>
+            <a:pPr lvl="1" fontAlgn="auto">
+              <a:spcAft>
+                <a:spcPts val="0"/>
+              </a:spcAft>
+              <a:defRPr/>
+            </a:pPr>
+            <a:r>
+              <a:rPr lang="en-US" sz="2000" dirty="0" err="1" smtClean="0"/>
+              <a:t>clickedNom</a:t>
+            </a:r>
+            <a:r>
+              <a:rPr lang="en-US" sz="2000" dirty="0" err="1" smtClean="0"/>
+              <a:t>inee</a:t>
+            </a:r>
+            <a:endParaRPr lang="en-US" sz="2000" dirty="0" smtClean="0"/>
+          </a:p>
+          <a:p>
+            <a:pPr lvl="1" fontAlgn="auto">
+              <a:spcAft>
+                <a:spcPts val="0"/>
+              </a:spcAft>
+              <a:defRPr/>
+            </a:pPr>
+            <a:r>
+              <a:rPr lang="en-US" sz="2000" dirty="0" err="1" smtClean="0"/>
+              <a:t>createSession</a:t>
+            </a:r>
+            <a:r>
+              <a:rPr lang="en-US" sz="2000" dirty="0" smtClean="0"/>
+              <a:t> (w/ Alex)</a:t>
+            </a:r>
+          </a:p>
+          <a:p>
+            <a:pPr lvl="1" fontAlgn="auto">
+              <a:spcAft>
+                <a:spcPts val="0"/>
+              </a:spcAft>
+              <a:defRPr/>
+            </a:pPr>
+            <a:r>
+              <a:rPr lang="en-US" sz="2000" dirty="0" err="1" smtClean="0"/>
+              <a:t>nomineeForm</a:t>
+            </a:r>
+            <a:endParaRPr lang="en-US" sz="2000" dirty="0" smtClean="0"/>
+          </a:p>
+          <a:p>
+            <a:pPr lvl="1" fontAlgn="auto">
+              <a:spcAft>
+                <a:spcPts val="0"/>
+              </a:spcAft>
+              <a:defRPr/>
+            </a:pPr>
+            <a:r>
+              <a:rPr lang="en-US" sz="2000" dirty="0" err="1" smtClean="0"/>
+              <a:t>gcHome</a:t>
+            </a:r>
+            <a:endParaRPr lang="en-US" sz="2000" dirty="0" smtClean="0"/>
+          </a:p>
+        </p:txBody>
+      </p:sp>
+    </p:spTree>
+  </p:cSld>
+  <p:clrMapOvr>
+    <a:masterClrMapping/>
+  </p:clrMapOvr>
+  <p:timing>
+    <p:tnLst>
+      <p:par>
+        <p:cTn xmlns:p14="http://schemas.microsoft.com/office/powerpoint/2010/main" id="1" dur="indefinite" restart="never" nodeType="tmRoot"/>
+      </p:par>
+    </p:tnLst>
+  </p:timing>
+</p:sld>
+</file>
+
+<file path=ppt/slides/slide6.xml><?xml version="1.0" encoding="utf-8"?>
+<p:sld xmlns:a="http://schemas.openxmlformats.org/drawingml/2006/main" xmlns:r="http://schemas.openxmlformats.org/officeDocument/2006/relationships" xmlns:p="http://schemas.openxmlformats.org/presentationml/2006/main">
+  <p:cSld>
+    <p:spTree>
+      <p:nvGrpSpPr>
+        <p:cNvPr id="1" name=""/>
+        <p:cNvGrpSpPr/>
+        <p:nvPr/>
+      </p:nvGrpSpPr>
+      <p:grpSpPr>
+        <a:xfrm>
+          <a:off x="0" y="0"/>
+          <a:ext cx="0" cy="0"/>
+          <a:chOff x="0" y="0"/>
+          <a:chExt cx="0" cy="0"/>
+        </a:xfrm>
+      </p:grpSpPr>
+      <p:sp>
+        <p:nvSpPr>
+          <p:cNvPr id="19458" name="Rectangle 2"/>
+          <p:cNvSpPr>
+            <a:spLocks noGrp="1"/>
+          </p:cNvSpPr>
+          <p:nvPr>
+            <p:ph type="title"/>
+          </p:nvPr>
+        </p:nvSpPr>
+        <p:spPr>
+          <a:xfrm>
+            <a:off x="664518" y="231863"/>
+            <a:ext cx="9404723" cy="1400530"/>
+          </a:xfrm>
+        </p:spPr>
+        <p:txBody>
+          <a:bodyPr/>
+          <a:lstStyle/>
+          <a:p>
+            <a:r>
+              <a:rPr lang="en-US" dirty="0" smtClean="0"/>
+              <a:t>Alex’s Contribution </a:t>
+            </a:r>
+          </a:p>
+        </p:txBody>
+      </p:sp>
+      <p:sp>
+        <p:nvSpPr>
+          <p:cNvPr id="19459" name="Rectangle 3"/>
+          <p:cNvSpPr>
+            <a:spLocks noGrp="1"/>
+          </p:cNvSpPr>
+          <p:nvPr>
+            <p:ph idx="1"/>
+          </p:nvPr>
+        </p:nvSpPr>
+        <p:spPr>
+          <a:xfrm>
+            <a:off x="1085886" y="1032430"/>
+            <a:ext cx="8946541" cy="4195481"/>
+          </a:xfrm>
+        </p:spPr>
+        <p:txBody>
+          <a:bodyPr>
+            <a:noAutofit/>
+          </a:bodyPr>
+          <a:lstStyle/>
+          <a:p>
+            <a:r>
+              <a:rPr lang="en-US" sz="2400" dirty="0" smtClean="0"/>
+              <a:t>Documentation</a:t>
+            </a:r>
+            <a:endParaRPr lang="en-US" sz="2400" dirty="0"/>
+          </a:p>
+          <a:p>
+            <a:pPr lvl="1"/>
+            <a:r>
+              <a:rPr lang="en-US" sz="2000" dirty="0"/>
+              <a:t>Worked on the documentation/user manual with </a:t>
+            </a:r>
+            <a:r>
+              <a:rPr lang="en-US" sz="2000" dirty="0" smtClean="0"/>
+              <a:t>Sammy</a:t>
+            </a:r>
+          </a:p>
+          <a:p>
+            <a:r>
+              <a:rPr lang="en-US" sz="2400" dirty="0" smtClean="0"/>
+              <a:t>Front </a:t>
+            </a:r>
+            <a:r>
+              <a:rPr lang="en-US" sz="2400" dirty="0"/>
+              <a:t>End </a:t>
+            </a:r>
+            <a:r>
+              <a:rPr lang="en-US" sz="2400" dirty="0" smtClean="0"/>
+              <a:t>Development (HTML/CSS/PHP/JS)</a:t>
+            </a:r>
+            <a:endParaRPr lang="en-US" sz="2400" dirty="0"/>
+          </a:p>
+          <a:p>
+            <a:pPr lvl="1"/>
+            <a:r>
+              <a:rPr lang="en-US" sz="2000" dirty="0" smtClean="0"/>
+              <a:t>Worked on the following </a:t>
+            </a:r>
+            <a:r>
+              <a:rPr lang="en-US" sz="2000" dirty="0" smtClean="0"/>
+              <a:t>views</a:t>
+            </a:r>
+          </a:p>
+          <a:p>
+            <a:pPr lvl="1"/>
+            <a:endParaRPr lang="en-US" sz="2000" dirty="0"/>
+          </a:p>
+          <a:p>
+            <a:pPr lvl="1"/>
+            <a:endParaRPr lang="en-US" sz="2000" dirty="0" smtClean="0"/>
+          </a:p>
+          <a:p>
+            <a:pPr lvl="1"/>
+            <a:endParaRPr lang="en-US" sz="2000" dirty="0" smtClean="0"/>
+          </a:p>
+          <a:p>
+            <a:pPr marL="457200" lvl="1" indent="0">
+              <a:buNone/>
+            </a:pPr>
+            <a:endParaRPr lang="en-US" sz="2000" dirty="0"/>
+          </a:p>
+          <a:p>
+            <a:pPr lvl="1"/>
+            <a:r>
+              <a:rPr lang="en-US" sz="2000" dirty="0" smtClean="0"/>
+              <a:t>Designed </a:t>
+            </a:r>
+            <a:r>
+              <a:rPr lang="en-US" sz="2000" dirty="0"/>
+              <a:t>the common CSS that is used in most of the </a:t>
+            </a:r>
+            <a:r>
+              <a:rPr lang="en-US" sz="2000" dirty="0" smtClean="0"/>
+              <a:t>forms</a:t>
+            </a:r>
+          </a:p>
+          <a:p>
+            <a:r>
+              <a:rPr lang="en-US" sz="2400" dirty="0" smtClean="0"/>
+              <a:t>Back End Development (PHP, SQL)</a:t>
+            </a:r>
+          </a:p>
+          <a:p>
+            <a:pPr lvl="1"/>
+            <a:r>
+              <a:rPr lang="en-US" sz="2000" dirty="0" smtClean="0"/>
+              <a:t>View for nominee approval (with Robin)</a:t>
+            </a:r>
+          </a:p>
+          <a:p>
+            <a:pPr lvl="1"/>
+            <a:r>
+              <a:rPr lang="en-US" sz="2000" dirty="0" smtClean="0"/>
+              <a:t>View for querying and displaying incomplete nominations</a:t>
+            </a:r>
+          </a:p>
+        </p:txBody>
+      </p:sp>
+      <p:sp>
+        <p:nvSpPr>
+          <p:cNvPr id="4" name="Content Placeholder 2"/>
+          <p:cNvSpPr txBox="1">
+            <a:spLocks/>
+          </p:cNvSpPr>
+          <p:nvPr/>
+        </p:nvSpPr>
+        <p:spPr>
+          <a:xfrm>
+            <a:off x="1868957" y="3018350"/>
+            <a:ext cx="10323043" cy="1453960"/>
+          </a:xfrm>
+          <a:prstGeom prst="rect">
+            <a:avLst/>
+          </a:prstGeom>
+        </p:spPr>
+        <p:txBody>
+          <a:bodyPr numCol="2"/>
+          <a:lstStyle>
+            <a:lvl1pPr marL="228600" indent="-228600" algn="l" defTabSz="914400" rtl="0" eaLnBrk="1" latinLnBrk="0" hangingPunct="1">
+              <a:lnSpc>
+                <a:spcPct val="90000"/>
+              </a:lnSpc>
+              <a:spcBef>
+                <a:spcPts val="1000"/>
+              </a:spcBef>
+              <a:buFont typeface="Arial" panose="020B0604020202020204" pitchFamily="34" charset="0"/>
+              <a:buChar char="•"/>
+              <a:defRPr sz="2800" kern="1200">
+                <a:solidFill>
+                  <a:schemeClr val="tx1"/>
+                </a:solidFill>
+                <a:latin typeface="+mn-lt"/>
+                <a:ea typeface="+mn-ea"/>
+                <a:cs typeface="+mn-cs"/>
+              </a:defRPr>
+            </a:lvl1pPr>
+            <a:lvl2pPr marL="685800" indent="-228600" algn="l" defTabSz="914400" rtl="0" eaLnBrk="1" latinLnBrk="0" hangingPunct="1">
+              <a:lnSpc>
+                <a:spcPct val="90000"/>
+              </a:lnSpc>
+              <a:spcBef>
+                <a:spcPts val="500"/>
+              </a:spcBef>
+              <a:buFont typeface="Arial" panose="020B0604020202020204" pitchFamily="34" charset="0"/>
+              <a:buChar char="•"/>
+              <a:defRPr sz="2400" kern="1200">
+                <a:solidFill>
+                  <a:schemeClr val="tx1"/>
+                </a:solidFill>
+                <a:latin typeface="+mn-lt"/>
+                <a:ea typeface="+mn-ea"/>
+                <a:cs typeface="+mn-cs"/>
+              </a:defRPr>
+            </a:lvl2pPr>
+            <a:lvl3pPr marL="1143000" indent="-228600" algn="l" defTabSz="914400" rtl="0" eaLnBrk="1" latinLnBrk="0" hangingPunct="1">
+              <a:lnSpc>
+                <a:spcPct val="90000"/>
+              </a:lnSpc>
+              <a:spcBef>
+                <a:spcPts val="500"/>
+              </a:spcBef>
+              <a:buFont typeface="Arial" panose="020B0604020202020204" pitchFamily="34" charset="0"/>
+              <a:buChar char="•"/>
+              <a:defRPr sz="2000" kern="1200">
+                <a:solidFill>
+                  <a:schemeClr val="tx1"/>
+                </a:solidFill>
+                <a:latin typeface="+mn-lt"/>
+                <a:ea typeface="+mn-ea"/>
+                <a:cs typeface="+mn-cs"/>
+              </a:defRPr>
+            </a:lvl3pPr>
+            <a:lvl4pPr marL="1600200" indent="-228600" algn="l" defTabSz="914400" rtl="0" eaLnBrk="1" latinLnBrk="0" hangingPunct="1">
+              <a:lnSpc>
+                <a:spcPct val="90000"/>
+              </a:lnSpc>
+              <a:spcBef>
+                <a:spcPts val="500"/>
+              </a:spcBef>
+              <a:buFont typeface="Arial" panose="020B0604020202020204" pitchFamily="34" charset="0"/>
+              <a:buChar char="•"/>
+              <a:defRPr sz="1800" kern="1200">
+                <a:solidFill>
+                  <a:schemeClr val="tx1"/>
+                </a:solidFill>
+                <a:latin typeface="+mn-lt"/>
+                <a:ea typeface="+mn-ea"/>
+                <a:cs typeface="+mn-cs"/>
+              </a:defRPr>
+            </a:lvl4pPr>
+            <a:lvl5pPr marL="2057400" indent="-228600" algn="l" defTabSz="914400" rtl="0" eaLnBrk="1" latinLnBrk="0" hangingPunct="1">
+              <a:lnSpc>
+                <a:spcPct val="90000"/>
+              </a:lnSpc>
+              <a:spcBef>
+                <a:spcPts val="500"/>
+              </a:spcBef>
+              <a:buFont typeface="Arial" panose="020B0604020202020204" pitchFamily="34" charset="0"/>
+              <a:buChar char="•"/>
+              <a:defRPr sz="1800" kern="1200">
+                <a:solidFill>
+                  <a:schemeClr val="tx1"/>
+                </a:solidFill>
+                <a:latin typeface="+mn-lt"/>
+                <a:ea typeface="+mn-ea"/>
+                <a:cs typeface="+mn-cs"/>
+              </a:defRPr>
+            </a:lvl5pPr>
+            <a:lvl6pPr marL="2514600" indent="-228600" algn="l" defTabSz="914400" rtl="0" eaLnBrk="1" latinLnBrk="0" hangingPunct="1">
+              <a:lnSpc>
+                <a:spcPct val="90000"/>
+              </a:lnSpc>
+              <a:spcBef>
+                <a:spcPts val="500"/>
+              </a:spcBef>
+              <a:buFont typeface="Arial" panose="020B0604020202020204" pitchFamily="34" charset="0"/>
+              <a:buChar char="•"/>
+              <a:defRPr sz="1800" kern="1200">
+                <a:solidFill>
+                  <a:schemeClr val="tx1"/>
+                </a:solidFill>
+                <a:latin typeface="+mn-lt"/>
+                <a:ea typeface="+mn-ea"/>
+                <a:cs typeface="+mn-cs"/>
+              </a:defRPr>
+            </a:lvl6pPr>
+            <a:lvl7pPr marL="2971800" indent="-228600" algn="l" defTabSz="914400" rtl="0" eaLnBrk="1" latinLnBrk="0" hangingPunct="1">
+              <a:lnSpc>
+                <a:spcPct val="90000"/>
+              </a:lnSpc>
+              <a:spcBef>
+                <a:spcPts val="500"/>
+              </a:spcBef>
+              <a:buFont typeface="Arial" panose="020B0604020202020204" pitchFamily="34" charset="0"/>
+              <a:buChar char="•"/>
+              <a:defRPr sz="1800" kern="1200">
+                <a:solidFill>
+                  <a:schemeClr val="tx1"/>
+                </a:solidFill>
+                <a:latin typeface="+mn-lt"/>
+                <a:ea typeface="+mn-ea"/>
+                <a:cs typeface="+mn-cs"/>
+              </a:defRPr>
+            </a:lvl7pPr>
+            <a:lvl8pPr marL="3429000" indent="-228600" algn="l" defTabSz="914400" rtl="0" eaLnBrk="1" latinLnBrk="0" hangingPunct="1">
+              <a:lnSpc>
+                <a:spcPct val="90000"/>
+              </a:lnSpc>
+              <a:spcBef>
+                <a:spcPts val="500"/>
+              </a:spcBef>
+              <a:buFont typeface="Arial" panose="020B0604020202020204" pitchFamily="34" charset="0"/>
+              <a:buChar char="•"/>
+              <a:defRPr sz="1800" kern="1200">
+                <a:solidFill>
+                  <a:schemeClr val="tx1"/>
+                </a:solidFill>
+                <a:latin typeface="+mn-lt"/>
+                <a:ea typeface="+mn-ea"/>
+                <a:cs typeface="+mn-cs"/>
+              </a:defRPr>
+            </a:lvl8pPr>
+            <a:lvl9pPr marL="3886200" indent="-228600" algn="l" defTabSz="914400" rtl="0" eaLnBrk="1" latinLnBrk="0" hangingPunct="1">
+              <a:lnSpc>
+                <a:spcPct val="90000"/>
+              </a:lnSpc>
+              <a:spcBef>
+                <a:spcPts val="500"/>
+              </a:spcBef>
+              <a:buFont typeface="Arial" panose="020B0604020202020204" pitchFamily="34" charset="0"/>
+              <a:buChar char="•"/>
+              <a:defRPr sz="1800" kern="1200">
+                <a:solidFill>
+                  <a:schemeClr val="tx1"/>
+                </a:solidFill>
+                <a:latin typeface="+mn-lt"/>
+                <a:ea typeface="+mn-ea"/>
+                <a:cs typeface="+mn-cs"/>
+              </a:defRPr>
+            </a:lvl9pPr>
+          </a:lstStyle>
+          <a:p>
+            <a:pPr lvl="1" fontAlgn="auto">
+              <a:spcAft>
+                <a:spcPts val="0"/>
+              </a:spcAft>
+              <a:defRPr/>
+            </a:pPr>
+            <a:r>
+              <a:rPr lang="en-US" sz="2000" dirty="0" smtClean="0"/>
+              <a:t>Add Nominees</a:t>
+            </a:r>
+          </a:p>
+          <a:p>
+            <a:pPr lvl="1" fontAlgn="auto">
+              <a:spcAft>
+                <a:spcPts val="0"/>
+              </a:spcAft>
+              <a:defRPr/>
+            </a:pPr>
+            <a:r>
+              <a:rPr lang="en-US" sz="2000" dirty="0" err="1"/>
+              <a:t>i</a:t>
+            </a:r>
+            <a:r>
+              <a:rPr lang="en-US" sz="2000" dirty="0" err="1" smtClean="0"/>
+              <a:t>ncompleteNominations</a:t>
+            </a:r>
+            <a:r>
+              <a:rPr lang="en-US" sz="2000" dirty="0" smtClean="0"/>
+              <a:t> (w/ Sammy)</a:t>
+            </a:r>
+          </a:p>
+          <a:p>
+            <a:pPr lvl="1" fontAlgn="auto">
+              <a:spcAft>
+                <a:spcPts val="0"/>
+              </a:spcAft>
+              <a:defRPr/>
+            </a:pPr>
+            <a:r>
+              <a:rPr lang="en-US" sz="2000" dirty="0" err="1" smtClean="0"/>
+              <a:t>createSession</a:t>
+            </a:r>
+            <a:r>
+              <a:rPr lang="en-US" sz="2000" dirty="0" smtClean="0"/>
+              <a:t> (w/ Julian)</a:t>
+            </a:r>
+          </a:p>
+          <a:p>
+            <a:pPr lvl="1" fontAlgn="auto">
+              <a:spcAft>
+                <a:spcPts val="0"/>
+              </a:spcAft>
+              <a:defRPr/>
+            </a:pPr>
+            <a:r>
+              <a:rPr lang="en-US" sz="2000" dirty="0" err="1" smtClean="0"/>
+              <a:t>currentSession</a:t>
+            </a:r>
+            <a:endParaRPr lang="en-US" sz="2000" dirty="0" smtClean="0"/>
+          </a:p>
+          <a:p>
+            <a:pPr lvl="1" fontAlgn="auto">
+              <a:spcAft>
+                <a:spcPts val="0"/>
+              </a:spcAft>
+              <a:defRPr/>
+            </a:pPr>
+            <a:r>
+              <a:rPr lang="en-US" sz="2000" dirty="0" err="1" smtClean="0"/>
+              <a:t>addNominators</a:t>
+            </a:r>
+            <a:endParaRPr lang="en-US" sz="2000" dirty="0" smtClean="0"/>
+          </a:p>
+          <a:p>
+            <a:pPr lvl="1" fontAlgn="auto">
+              <a:spcAft>
+                <a:spcPts val="0"/>
+              </a:spcAft>
+              <a:defRPr/>
+            </a:pPr>
+            <a:r>
+              <a:rPr lang="en-US" sz="2000" dirty="0" smtClean="0"/>
+              <a:t>Persistent sidebar</a:t>
+            </a:r>
+            <a:endParaRPr lang="en-US" sz="2000" dirty="0" smtClean="0"/>
+          </a:p>
+        </p:txBody>
+      </p:sp>
+    </p:spTree>
+  </p:cSld>
+  <p:clrMapOvr>
+    <a:masterClrMapping/>
+  </p:clrMapOvr>
+  <p:timing>
+    <p:tnLst>
+      <p:par>
+        <p:cTn xmlns:p14="http://schemas.microsoft.com/office/powerpoint/2010/main" id="1" dur="indefinite" restart="never" nodeType="tmRoot"/>
+      </p:par>
+    </p:tnLst>
+  </p:timing>
+</p:sld>
+</file>
+
+<file path=ppt/slides/slide7.xml><?xml version="1.0" encoding="utf-8"?>
+<p:sld xmlns:a="http://schemas.openxmlformats.org/drawingml/2006/main" xmlns:r="http://schemas.openxmlformats.org/officeDocument/2006/relationships" xmlns:p="http://schemas.openxmlformats.org/presentationml/2006/main">
+  <p:cSld>
+    <p:spTree>
+      <p:nvGrpSpPr>
+        <p:cNvPr id="1" name=""/>
+        <p:cNvGrpSpPr/>
+        <p:nvPr/>
+      </p:nvGrpSpPr>
+      <p:grpSpPr>
+        <a:xfrm>
+          <a:off x="0" y="0"/>
+          <a:ext cx="0" cy="0"/>
+          <a:chOff x="0" y="0"/>
+          <a:chExt cx="0" cy="0"/>
+        </a:xfrm>
+      </p:grpSpPr>
+      <p:sp>
+        <p:nvSpPr>
+          <p:cNvPr id="2" name="Title 1"/>
+          <p:cNvSpPr>
+            <a:spLocks noGrp="1"/>
+          </p:cNvSpPr>
+          <p:nvPr>
+            <p:ph type="title"/>
+          </p:nvPr>
+        </p:nvSpPr>
+        <p:spPr/>
+        <p:txBody>
+          <a:bodyPr/>
+          <a:lstStyle/>
+          <a:p>
+            <a:r>
+              <a:rPr lang="en-US" dirty="0" smtClean="0"/>
+              <a:t>Sammy’s Contribution</a:t>
+            </a:r>
+            <a:endParaRPr lang="en-US" dirty="0"/>
+          </a:p>
+        </p:txBody>
+      </p:sp>
+      <p:sp>
+        <p:nvSpPr>
+          <p:cNvPr id="3" name="Content Placeholder 2"/>
+          <p:cNvSpPr>
+            <a:spLocks noGrp="1"/>
+          </p:cNvSpPr>
+          <p:nvPr>
+            <p:ph idx="1"/>
+          </p:nvPr>
+        </p:nvSpPr>
+        <p:spPr>
+          <a:xfrm>
+            <a:off x="838200" y="1825625"/>
+            <a:ext cx="10515600" cy="4808855"/>
+          </a:xfrm>
+        </p:spPr>
+        <p:txBody>
+          <a:bodyPr/>
+          <a:lstStyle/>
+          <a:p>
+            <a:r>
+              <a:rPr lang="en-US" dirty="0" smtClean="0"/>
+              <a:t>Worked on the user manual</a:t>
+            </a:r>
+          </a:p>
+          <a:p>
+            <a:r>
+              <a:rPr lang="en-US" dirty="0" smtClean="0"/>
+              <a:t>Wrote the initial schema design for the project</a:t>
+            </a:r>
+          </a:p>
+          <a:p>
+            <a:pPr lvl="1"/>
+            <a:r>
+              <a:rPr lang="en-US" dirty="0" smtClean="0"/>
+              <a:t>Was minimally modified as we worked on the project</a:t>
+            </a:r>
+          </a:p>
+          <a:p>
+            <a:r>
+              <a:rPr lang="en-US" dirty="0" smtClean="0"/>
+              <a:t>Organized the original project directories in compliance to the MVC design pattern</a:t>
+            </a:r>
+          </a:p>
+          <a:p>
+            <a:r>
+              <a:rPr lang="en-US" dirty="0" smtClean="0"/>
+              <a:t>Backend Development:</a:t>
+            </a:r>
+          </a:p>
+          <a:p>
+            <a:endParaRPr lang="en-US" dirty="0"/>
+          </a:p>
+        </p:txBody>
+      </p:sp>
+      <p:sp>
+        <p:nvSpPr>
+          <p:cNvPr id="4" name="Content Placeholder 2"/>
+          <p:cNvSpPr txBox="1">
+            <a:spLocks/>
+          </p:cNvSpPr>
+          <p:nvPr/>
+        </p:nvSpPr>
+        <p:spPr>
+          <a:xfrm>
+            <a:off x="934478" y="4334202"/>
+            <a:ext cx="10323043" cy="1708210"/>
+          </a:xfrm>
+          <a:prstGeom prst="rect">
+            <a:avLst/>
+          </a:prstGeom>
+        </p:spPr>
+        <p:txBody>
+          <a:bodyPr numCol="2"/>
+          <a:lstStyle>
+            <a:lvl1pPr marL="228600" indent="-228600" algn="l" defTabSz="914400" rtl="0" eaLnBrk="1" latinLnBrk="0" hangingPunct="1">
+              <a:lnSpc>
+                <a:spcPct val="90000"/>
+              </a:lnSpc>
+              <a:spcBef>
+                <a:spcPts val="1000"/>
+              </a:spcBef>
+              <a:buFont typeface="Arial" panose="020B0604020202020204" pitchFamily="34" charset="0"/>
+              <a:buChar char="•"/>
+              <a:defRPr sz="2800" kern="1200">
+                <a:solidFill>
+                  <a:schemeClr val="tx1"/>
+                </a:solidFill>
+                <a:latin typeface="+mn-lt"/>
+                <a:ea typeface="+mn-ea"/>
+                <a:cs typeface="+mn-cs"/>
+              </a:defRPr>
+            </a:lvl1pPr>
+            <a:lvl2pPr marL="685800" indent="-228600" algn="l" defTabSz="914400" rtl="0" eaLnBrk="1" latinLnBrk="0" hangingPunct="1">
+              <a:lnSpc>
+                <a:spcPct val="90000"/>
+              </a:lnSpc>
+              <a:spcBef>
+                <a:spcPts val="500"/>
+              </a:spcBef>
+              <a:buFont typeface="Arial" panose="020B0604020202020204" pitchFamily="34" charset="0"/>
+              <a:buChar char="•"/>
+              <a:defRPr sz="2400" kern="1200">
+                <a:solidFill>
+                  <a:schemeClr val="tx1"/>
+                </a:solidFill>
+                <a:latin typeface="+mn-lt"/>
+                <a:ea typeface="+mn-ea"/>
+                <a:cs typeface="+mn-cs"/>
+              </a:defRPr>
+            </a:lvl2pPr>
+            <a:lvl3pPr marL="1143000" indent="-228600" algn="l" defTabSz="914400" rtl="0" eaLnBrk="1" latinLnBrk="0" hangingPunct="1">
+              <a:lnSpc>
+                <a:spcPct val="90000"/>
+              </a:lnSpc>
+              <a:spcBef>
+                <a:spcPts val="500"/>
+              </a:spcBef>
+              <a:buFont typeface="Arial" panose="020B0604020202020204" pitchFamily="34" charset="0"/>
+              <a:buChar char="•"/>
+              <a:defRPr sz="2000" kern="1200">
+                <a:solidFill>
+                  <a:schemeClr val="tx1"/>
+                </a:solidFill>
+                <a:latin typeface="+mn-lt"/>
+                <a:ea typeface="+mn-ea"/>
+                <a:cs typeface="+mn-cs"/>
+              </a:defRPr>
+            </a:lvl3pPr>
+            <a:lvl4pPr marL="1600200" indent="-228600" algn="l" defTabSz="914400" rtl="0" eaLnBrk="1" latinLnBrk="0" hangingPunct="1">
+              <a:lnSpc>
+                <a:spcPct val="90000"/>
+              </a:lnSpc>
+              <a:spcBef>
+                <a:spcPts val="500"/>
+              </a:spcBef>
+              <a:buFont typeface="Arial" panose="020B0604020202020204" pitchFamily="34" charset="0"/>
+              <a:buChar char="•"/>
+              <a:defRPr sz="1800" kern="1200">
+                <a:solidFill>
+                  <a:schemeClr val="tx1"/>
+                </a:solidFill>
+                <a:latin typeface="+mn-lt"/>
+                <a:ea typeface="+mn-ea"/>
+                <a:cs typeface="+mn-cs"/>
+              </a:defRPr>
+            </a:lvl4pPr>
+            <a:lvl5pPr marL="2057400" indent="-228600" algn="l" defTabSz="914400" rtl="0" eaLnBrk="1" latinLnBrk="0" hangingPunct="1">
+              <a:lnSpc>
+                <a:spcPct val="90000"/>
+              </a:lnSpc>
+              <a:spcBef>
+                <a:spcPts val="500"/>
+              </a:spcBef>
+              <a:buFont typeface="Arial" panose="020B0604020202020204" pitchFamily="34" charset="0"/>
+              <a:buChar char="•"/>
+              <a:defRPr sz="1800" kern="1200">
+                <a:solidFill>
+                  <a:schemeClr val="tx1"/>
+                </a:solidFill>
+                <a:latin typeface="+mn-lt"/>
+                <a:ea typeface="+mn-ea"/>
+                <a:cs typeface="+mn-cs"/>
+              </a:defRPr>
+            </a:lvl5pPr>
+            <a:lvl6pPr marL="2514600" indent="-228600" algn="l" defTabSz="914400" rtl="0" eaLnBrk="1" latinLnBrk="0" hangingPunct="1">
+              <a:lnSpc>
+                <a:spcPct val="90000"/>
+              </a:lnSpc>
+              <a:spcBef>
+                <a:spcPts val="500"/>
+              </a:spcBef>
+              <a:buFont typeface="Arial" panose="020B0604020202020204" pitchFamily="34" charset="0"/>
+              <a:buChar char="•"/>
+              <a:defRPr sz="1800" kern="1200">
+                <a:solidFill>
+                  <a:schemeClr val="tx1"/>
+                </a:solidFill>
+                <a:latin typeface="+mn-lt"/>
+                <a:ea typeface="+mn-ea"/>
+                <a:cs typeface="+mn-cs"/>
+              </a:defRPr>
+            </a:lvl6pPr>
+            <a:lvl7pPr marL="2971800" indent="-228600" algn="l" defTabSz="914400" rtl="0" eaLnBrk="1" latinLnBrk="0" hangingPunct="1">
+              <a:lnSpc>
+                <a:spcPct val="90000"/>
+              </a:lnSpc>
+              <a:spcBef>
+                <a:spcPts val="500"/>
+              </a:spcBef>
+              <a:buFont typeface="Arial" panose="020B0604020202020204" pitchFamily="34" charset="0"/>
+              <a:buChar char="•"/>
+              <a:defRPr sz="1800" kern="1200">
+                <a:solidFill>
+                  <a:schemeClr val="tx1"/>
+                </a:solidFill>
+                <a:latin typeface="+mn-lt"/>
+                <a:ea typeface="+mn-ea"/>
+                <a:cs typeface="+mn-cs"/>
+              </a:defRPr>
+            </a:lvl7pPr>
+            <a:lvl8pPr marL="3429000" indent="-228600" algn="l" defTabSz="914400" rtl="0" eaLnBrk="1" latinLnBrk="0" hangingPunct="1">
+              <a:lnSpc>
+                <a:spcPct val="90000"/>
+              </a:lnSpc>
+              <a:spcBef>
+                <a:spcPts val="500"/>
+              </a:spcBef>
+              <a:buFont typeface="Arial" panose="020B0604020202020204" pitchFamily="34" charset="0"/>
+              <a:buChar char="•"/>
+              <a:defRPr sz="1800" kern="1200">
+                <a:solidFill>
+                  <a:schemeClr val="tx1"/>
+                </a:solidFill>
+                <a:latin typeface="+mn-lt"/>
+                <a:ea typeface="+mn-ea"/>
+                <a:cs typeface="+mn-cs"/>
+              </a:defRPr>
+            </a:lvl8pPr>
+            <a:lvl9pPr marL="3886200" indent="-228600" algn="l" defTabSz="914400" rtl="0" eaLnBrk="1" latinLnBrk="0" hangingPunct="1">
+              <a:lnSpc>
+                <a:spcPct val="90000"/>
+              </a:lnSpc>
+              <a:spcBef>
+                <a:spcPts val="500"/>
+              </a:spcBef>
+              <a:buFont typeface="Arial" panose="020B0604020202020204" pitchFamily="34" charset="0"/>
+              <a:buChar char="•"/>
+              <a:defRPr sz="1800" kern="1200">
+                <a:solidFill>
+                  <a:schemeClr val="tx1"/>
+                </a:solidFill>
+                <a:latin typeface="+mn-lt"/>
+                <a:ea typeface="+mn-ea"/>
+                <a:cs typeface="+mn-cs"/>
+              </a:defRPr>
+            </a:lvl9pPr>
+          </a:lstStyle>
+          <a:p>
+            <a:pPr lvl="1" fontAlgn="auto">
+              <a:spcAft>
+                <a:spcPts val="0"/>
+              </a:spcAft>
+              <a:defRPr/>
+            </a:pPr>
+            <a:r>
               <a:rPr lang="en-US" sz="2000" dirty="0" smtClean="0"/>
               <a:t>Email Service</a:t>
             </a:r>
@@ -8825,7 +9353,7 @@
   <p:timing>
     <p:tnLst>
       <p:par>
-        <p:cTn id="1" dur="indefinite" restart="never" nodeType="tmRoot"/>
+        <p:cTn xmlns:p14="http://schemas.microsoft.com/office/powerpoint/2010/main" id="1" dur="indefinite" restart="never" nodeType="tmRoot"/>
       </p:par>
     </p:tnLst>
   </p:timing>
@@ -8918,7 +9446,7 @@
   <p:timing>
     <p:tnLst>
       <p:par>
-        <p:cTn id="1" dur="indefinite" restart="never" nodeType="tmRoot"/>
+        <p:cTn xmlns:p14="http://schemas.microsoft.com/office/powerpoint/2010/main" id="1" dur="indefinite" restart="never" nodeType="tmRoot"/>
       </p:par>
     </p:tnLst>
   </p:timing>
@@ -8968,7 +9496,7 @@
     </a:clrScheme>
     <a:fontScheme name="Ion">
       <a:majorFont>
-        <a:latin typeface="Century Gothic" panose="020B0502020202020204"/>
+        <a:latin typeface="Century Gothic"/>
         <a:ea typeface=""/>
         <a:cs typeface=""/>
         <a:font script="Jpan" typeface="メイリオ"/>
@@ -9003,7 +9531,7 @@
         <a:font script="Geor" typeface="Sylfaen"/>
       </a:majorFont>
       <a:minorFont>
-        <a:latin typeface="Century Gothic" panose="020B0502020202020204"/>
+        <a:latin typeface="Century Gothic"/>
         <a:ea typeface=""/>
         <a:cs typeface=""/>
         <a:font script="Jpan" typeface="メイリオ"/>
@@ -9185,7 +9713,7 @@
   <a:extraClrSchemeLst/>
   <a:extLst>
     <a:ext uri="{05A4C25C-085E-4340-85A3-A5531E510DB2}">
-      <thm15:themeFamily xmlns:thm15="http://schemas.microsoft.com/office/thememl/2012/main" name="Ion" id="{B8441ADB-2E43-4AF7-B97A-BD870242C6A8}" vid="{292E63A9-BB86-4E3D-B92A-7223C6510D2E}"/>
+      <thm15:themeFamily xmlns:thm15="http://schemas.microsoft.com/office/thememl/2012/main" xmlns="" name="Ion" id="{B8441ADB-2E43-4AF7-B97A-BD870242C6A8}" vid="{292E63A9-BB86-4E3D-B92A-7223C6510D2E}"/>
     </a:ext>
   </a:extLst>
 </a:theme>
@@ -9446,7 +9974,7 @@
   <a:extraClrSchemeLst/>
   <a:extLst>
     <a:ext uri="{05A4C25C-085E-4340-85A3-A5531E510DB2}">
-      <thm15:themeFamily xmlns:thm15="http://schemas.microsoft.com/office/thememl/2012/main" name="Office Theme" id="{62F939B6-93AF-4DB8-9C6B-D6C7DFDC589F}" vid="{4A3C46E8-61CC-4603-A589-7422A47A8E4A}"/>
+      <thm15:themeFamily xmlns:thm15="http://schemas.microsoft.com/office/thememl/2012/main" xmlns="" name="Office Theme" id="{62F939B6-93AF-4DB8-9C6B-D6C7DFDC589F}" vid="{4A3C46E8-61CC-4603-A589-7422A47A8E4A}"/>
     </a:ext>
   </a:extLst>
 </a:theme>

</xml_diff>